<commit_message>
updated with more recent graphs and packages
</commit_message>
<xml_diff>
--- a/DataVisualizationMenu.pptx
+++ b/DataVisualizationMenu.pptx
@@ -18,7 +18,6 @@
     <p:sldId id="267" r:id="rId12"/>
     <p:sldId id="268" r:id="rId13"/>
     <p:sldId id="270" r:id="rId14"/>
-    <p:sldId id="269" r:id="rId15"/>
   </p:sldIdLst>
   <p:sldSz cx="12192000" cy="6858000"/>
   <p:notesSz cx="6858000" cy="9144000"/>
@@ -167,10 +166,9 @@
           </a:lstStyle>
           <a:p>
             <a:r>
-              <a:rPr lang="en-US" smtClean="0"/>
+              <a:rPr lang="en-US"/>
               <a:t>Click to edit Master title style</a:t>
             </a:r>
-            <a:endParaRPr lang="en-US"/>
           </a:p>
         </p:txBody>
       </p:sp>
@@ -232,10 +230,9 @@
           </a:lstStyle>
           <a:p>
             <a:r>
-              <a:rPr lang="en-US" smtClean="0"/>
+              <a:rPr lang="en-US"/>
               <a:t>Click to edit Master subtitle style</a:t>
             </a:r>
-            <a:endParaRPr lang="en-US"/>
           </a:p>
         </p:txBody>
       </p:sp>
@@ -256,7 +253,7 @@
           <a:p>
             <a:fld id="{C518ABF7-4099-46EB-BEB9-ADE57982C939}" type="datetimeFigureOut">
               <a:rPr lang="en-US" smtClean="0"/>
-              <a:t>3/9/2020</a:t>
+              <a:t>10/2/2020</a:t>
             </a:fld>
             <a:endParaRPr lang="en-US"/>
           </a:p>
@@ -350,10 +347,9 @@
           <a:lstStyle/>
           <a:p>
             <a:r>
-              <a:rPr lang="en-US" smtClean="0"/>
+              <a:rPr lang="en-US"/>
               <a:t>Click to edit Master title style</a:t>
             </a:r>
-            <a:endParaRPr lang="en-US"/>
           </a:p>
         </p:txBody>
       </p:sp>
@@ -374,38 +370,37 @@
           <a:p>
             <a:pPr lvl="0"/>
             <a:r>
-              <a:rPr lang="en-US" smtClean="0"/>
+              <a:rPr lang="en-US"/>
               <a:t>Edit Master text styles</a:t>
             </a:r>
           </a:p>
           <a:p>
             <a:pPr lvl="1"/>
             <a:r>
-              <a:rPr lang="en-US" smtClean="0"/>
+              <a:rPr lang="en-US"/>
               <a:t>Second level</a:t>
             </a:r>
           </a:p>
           <a:p>
             <a:pPr lvl="2"/>
             <a:r>
-              <a:rPr lang="en-US" smtClean="0"/>
+              <a:rPr lang="en-US"/>
               <a:t>Third level</a:t>
             </a:r>
           </a:p>
           <a:p>
             <a:pPr lvl="3"/>
             <a:r>
-              <a:rPr lang="en-US" smtClean="0"/>
+              <a:rPr lang="en-US"/>
               <a:t>Fourth level</a:t>
             </a:r>
           </a:p>
           <a:p>
             <a:pPr lvl="4"/>
             <a:r>
-              <a:rPr lang="en-US" smtClean="0"/>
+              <a:rPr lang="en-US"/>
               <a:t>Fifth level</a:t>
             </a:r>
-            <a:endParaRPr lang="en-US"/>
           </a:p>
         </p:txBody>
       </p:sp>
@@ -426,7 +421,7 @@
           <a:p>
             <a:fld id="{C518ABF7-4099-46EB-BEB9-ADE57982C939}" type="datetimeFigureOut">
               <a:rPr lang="en-US" smtClean="0"/>
-              <a:t>3/9/2020</a:t>
+              <a:t>10/2/2020</a:t>
             </a:fld>
             <a:endParaRPr lang="en-US"/>
           </a:p>
@@ -525,10 +520,9 @@
           <a:lstStyle/>
           <a:p>
             <a:r>
-              <a:rPr lang="en-US" smtClean="0"/>
+              <a:rPr lang="en-US"/>
               <a:t>Click to edit Master title style</a:t>
             </a:r>
-            <a:endParaRPr lang="en-US"/>
           </a:p>
         </p:txBody>
       </p:sp>
@@ -554,38 +548,37 @@
           <a:p>
             <a:pPr lvl="0"/>
             <a:r>
-              <a:rPr lang="en-US" smtClean="0"/>
+              <a:rPr lang="en-US"/>
               <a:t>Edit Master text styles</a:t>
             </a:r>
           </a:p>
           <a:p>
             <a:pPr lvl="1"/>
             <a:r>
-              <a:rPr lang="en-US" smtClean="0"/>
+              <a:rPr lang="en-US"/>
               <a:t>Second level</a:t>
             </a:r>
           </a:p>
           <a:p>
             <a:pPr lvl="2"/>
             <a:r>
-              <a:rPr lang="en-US" smtClean="0"/>
+              <a:rPr lang="en-US"/>
               <a:t>Third level</a:t>
             </a:r>
           </a:p>
           <a:p>
             <a:pPr lvl="3"/>
             <a:r>
-              <a:rPr lang="en-US" smtClean="0"/>
+              <a:rPr lang="en-US"/>
               <a:t>Fourth level</a:t>
             </a:r>
           </a:p>
           <a:p>
             <a:pPr lvl="4"/>
             <a:r>
-              <a:rPr lang="en-US" smtClean="0"/>
+              <a:rPr lang="en-US"/>
               <a:t>Fifth level</a:t>
             </a:r>
-            <a:endParaRPr lang="en-US"/>
           </a:p>
         </p:txBody>
       </p:sp>
@@ -606,7 +599,7 @@
           <a:p>
             <a:fld id="{C518ABF7-4099-46EB-BEB9-ADE57982C939}" type="datetimeFigureOut">
               <a:rPr lang="en-US" smtClean="0"/>
-              <a:t>3/9/2020</a:t>
+              <a:t>10/2/2020</a:t>
             </a:fld>
             <a:endParaRPr lang="en-US"/>
           </a:p>
@@ -700,10 +693,9 @@
           <a:lstStyle/>
           <a:p>
             <a:r>
-              <a:rPr lang="en-US" smtClean="0"/>
+              <a:rPr lang="en-US"/>
               <a:t>Click to edit Master title style</a:t>
             </a:r>
-            <a:endParaRPr lang="en-US"/>
           </a:p>
         </p:txBody>
       </p:sp>
@@ -724,38 +716,37 @@
           <a:p>
             <a:pPr lvl="0"/>
             <a:r>
-              <a:rPr lang="en-US" smtClean="0"/>
+              <a:rPr lang="en-US"/>
               <a:t>Edit Master text styles</a:t>
             </a:r>
           </a:p>
           <a:p>
             <a:pPr lvl="1"/>
             <a:r>
-              <a:rPr lang="en-US" smtClean="0"/>
+              <a:rPr lang="en-US"/>
               <a:t>Second level</a:t>
             </a:r>
           </a:p>
           <a:p>
             <a:pPr lvl="2"/>
             <a:r>
-              <a:rPr lang="en-US" smtClean="0"/>
+              <a:rPr lang="en-US"/>
               <a:t>Third level</a:t>
             </a:r>
           </a:p>
           <a:p>
             <a:pPr lvl="3"/>
             <a:r>
-              <a:rPr lang="en-US" smtClean="0"/>
+              <a:rPr lang="en-US"/>
               <a:t>Fourth level</a:t>
             </a:r>
           </a:p>
           <a:p>
             <a:pPr lvl="4"/>
             <a:r>
-              <a:rPr lang="en-US" smtClean="0"/>
+              <a:rPr lang="en-US"/>
               <a:t>Fifth level</a:t>
             </a:r>
-            <a:endParaRPr lang="en-US"/>
           </a:p>
         </p:txBody>
       </p:sp>
@@ -776,7 +767,7 @@
           <a:p>
             <a:fld id="{C518ABF7-4099-46EB-BEB9-ADE57982C939}" type="datetimeFigureOut">
               <a:rPr lang="en-US" smtClean="0"/>
-              <a:t>3/9/2020</a:t>
+              <a:t>10/2/2020</a:t>
             </a:fld>
             <a:endParaRPr lang="en-US"/>
           </a:p>
@@ -879,10 +870,9 @@
           </a:lstStyle>
           <a:p>
             <a:r>
-              <a:rPr lang="en-US" smtClean="0"/>
+              <a:rPr lang="en-US"/>
               <a:t>Click to edit Master title style</a:t>
             </a:r>
-            <a:endParaRPr lang="en-US"/>
           </a:p>
         </p:txBody>
       </p:sp>
@@ -999,7 +989,7 @@
           <a:p>
             <a:pPr lvl="0"/>
             <a:r>
-              <a:rPr lang="en-US" smtClean="0"/>
+              <a:rPr lang="en-US"/>
               <a:t>Edit Master text styles</a:t>
             </a:r>
           </a:p>
@@ -1022,7 +1012,7 @@
           <a:p>
             <a:fld id="{C518ABF7-4099-46EB-BEB9-ADE57982C939}" type="datetimeFigureOut">
               <a:rPr lang="en-US" smtClean="0"/>
-              <a:t>3/9/2020</a:t>
+              <a:t>10/2/2020</a:t>
             </a:fld>
             <a:endParaRPr lang="en-US"/>
           </a:p>
@@ -1116,10 +1106,9 @@
           <a:lstStyle/>
           <a:p>
             <a:r>
-              <a:rPr lang="en-US" smtClean="0"/>
+              <a:rPr lang="en-US"/>
               <a:t>Click to edit Master title style</a:t>
             </a:r>
-            <a:endParaRPr lang="en-US"/>
           </a:p>
         </p:txBody>
       </p:sp>
@@ -1145,38 +1134,37 @@
           <a:p>
             <a:pPr lvl="0"/>
             <a:r>
-              <a:rPr lang="en-US" smtClean="0"/>
+              <a:rPr lang="en-US"/>
               <a:t>Edit Master text styles</a:t>
             </a:r>
           </a:p>
           <a:p>
             <a:pPr lvl="1"/>
             <a:r>
-              <a:rPr lang="en-US" smtClean="0"/>
+              <a:rPr lang="en-US"/>
               <a:t>Second level</a:t>
             </a:r>
           </a:p>
           <a:p>
             <a:pPr lvl="2"/>
             <a:r>
-              <a:rPr lang="en-US" smtClean="0"/>
+              <a:rPr lang="en-US"/>
               <a:t>Third level</a:t>
             </a:r>
           </a:p>
           <a:p>
             <a:pPr lvl="3"/>
             <a:r>
-              <a:rPr lang="en-US" smtClean="0"/>
+              <a:rPr lang="en-US"/>
               <a:t>Fourth level</a:t>
             </a:r>
           </a:p>
           <a:p>
             <a:pPr lvl="4"/>
             <a:r>
-              <a:rPr lang="en-US" smtClean="0"/>
+              <a:rPr lang="en-US"/>
               <a:t>Fifth level</a:t>
             </a:r>
-            <a:endParaRPr lang="en-US"/>
           </a:p>
         </p:txBody>
       </p:sp>
@@ -1202,38 +1190,37 @@
           <a:p>
             <a:pPr lvl="0"/>
             <a:r>
-              <a:rPr lang="en-US" smtClean="0"/>
+              <a:rPr lang="en-US"/>
               <a:t>Edit Master text styles</a:t>
             </a:r>
           </a:p>
           <a:p>
             <a:pPr lvl="1"/>
             <a:r>
-              <a:rPr lang="en-US" smtClean="0"/>
+              <a:rPr lang="en-US"/>
               <a:t>Second level</a:t>
             </a:r>
           </a:p>
           <a:p>
             <a:pPr lvl="2"/>
             <a:r>
-              <a:rPr lang="en-US" smtClean="0"/>
+              <a:rPr lang="en-US"/>
               <a:t>Third level</a:t>
             </a:r>
           </a:p>
           <a:p>
             <a:pPr lvl="3"/>
             <a:r>
-              <a:rPr lang="en-US" smtClean="0"/>
+              <a:rPr lang="en-US"/>
               <a:t>Fourth level</a:t>
             </a:r>
           </a:p>
           <a:p>
             <a:pPr lvl="4"/>
             <a:r>
-              <a:rPr lang="en-US" smtClean="0"/>
+              <a:rPr lang="en-US"/>
               <a:t>Fifth level</a:t>
             </a:r>
-            <a:endParaRPr lang="en-US"/>
           </a:p>
         </p:txBody>
       </p:sp>
@@ -1254,7 +1241,7 @@
           <a:p>
             <a:fld id="{C518ABF7-4099-46EB-BEB9-ADE57982C939}" type="datetimeFigureOut">
               <a:rPr lang="en-US" smtClean="0"/>
-              <a:t>3/9/2020</a:t>
+              <a:t>10/2/2020</a:t>
             </a:fld>
             <a:endParaRPr lang="en-US"/>
           </a:p>
@@ -1353,10 +1340,9 @@
           <a:lstStyle/>
           <a:p>
             <a:r>
-              <a:rPr lang="en-US" smtClean="0"/>
+              <a:rPr lang="en-US"/>
               <a:t>Click to edit Master title style</a:t>
             </a:r>
-            <a:endParaRPr lang="en-US"/>
           </a:p>
         </p:txBody>
       </p:sp>
@@ -1419,7 +1405,7 @@
           <a:p>
             <a:pPr lvl="0"/>
             <a:r>
-              <a:rPr lang="en-US" smtClean="0"/>
+              <a:rPr lang="en-US"/>
               <a:t>Edit Master text styles</a:t>
             </a:r>
           </a:p>
@@ -1447,38 +1433,37 @@
           <a:p>
             <a:pPr lvl="0"/>
             <a:r>
-              <a:rPr lang="en-US" smtClean="0"/>
+              <a:rPr lang="en-US"/>
               <a:t>Edit Master text styles</a:t>
             </a:r>
           </a:p>
           <a:p>
             <a:pPr lvl="1"/>
             <a:r>
-              <a:rPr lang="en-US" smtClean="0"/>
+              <a:rPr lang="en-US"/>
               <a:t>Second level</a:t>
             </a:r>
           </a:p>
           <a:p>
             <a:pPr lvl="2"/>
             <a:r>
-              <a:rPr lang="en-US" smtClean="0"/>
+              <a:rPr lang="en-US"/>
               <a:t>Third level</a:t>
             </a:r>
           </a:p>
           <a:p>
             <a:pPr lvl="3"/>
             <a:r>
-              <a:rPr lang="en-US" smtClean="0"/>
+              <a:rPr lang="en-US"/>
               <a:t>Fourth level</a:t>
             </a:r>
           </a:p>
           <a:p>
             <a:pPr lvl="4"/>
             <a:r>
-              <a:rPr lang="en-US" smtClean="0"/>
+              <a:rPr lang="en-US"/>
               <a:t>Fifth level</a:t>
             </a:r>
-            <a:endParaRPr lang="en-US"/>
           </a:p>
         </p:txBody>
       </p:sp>
@@ -1541,7 +1526,7 @@
           <a:p>
             <a:pPr lvl="0"/>
             <a:r>
-              <a:rPr lang="en-US" smtClean="0"/>
+              <a:rPr lang="en-US"/>
               <a:t>Edit Master text styles</a:t>
             </a:r>
           </a:p>
@@ -1569,38 +1554,37 @@
           <a:p>
             <a:pPr lvl="0"/>
             <a:r>
-              <a:rPr lang="en-US" smtClean="0"/>
+              <a:rPr lang="en-US"/>
               <a:t>Edit Master text styles</a:t>
             </a:r>
           </a:p>
           <a:p>
             <a:pPr lvl="1"/>
             <a:r>
-              <a:rPr lang="en-US" smtClean="0"/>
+              <a:rPr lang="en-US"/>
               <a:t>Second level</a:t>
             </a:r>
           </a:p>
           <a:p>
             <a:pPr lvl="2"/>
             <a:r>
-              <a:rPr lang="en-US" smtClean="0"/>
+              <a:rPr lang="en-US"/>
               <a:t>Third level</a:t>
             </a:r>
           </a:p>
           <a:p>
             <a:pPr lvl="3"/>
             <a:r>
-              <a:rPr lang="en-US" smtClean="0"/>
+              <a:rPr lang="en-US"/>
               <a:t>Fourth level</a:t>
             </a:r>
           </a:p>
           <a:p>
             <a:pPr lvl="4"/>
             <a:r>
-              <a:rPr lang="en-US" smtClean="0"/>
+              <a:rPr lang="en-US"/>
               <a:t>Fifth level</a:t>
             </a:r>
-            <a:endParaRPr lang="en-US"/>
           </a:p>
         </p:txBody>
       </p:sp>
@@ -1621,7 +1605,7 @@
           <a:p>
             <a:fld id="{C518ABF7-4099-46EB-BEB9-ADE57982C939}" type="datetimeFigureOut">
               <a:rPr lang="en-US" smtClean="0"/>
-              <a:t>3/9/2020</a:t>
+              <a:t>10/2/2020</a:t>
             </a:fld>
             <a:endParaRPr lang="en-US"/>
           </a:p>
@@ -1715,10 +1699,9 @@
           <a:lstStyle/>
           <a:p>
             <a:r>
-              <a:rPr lang="en-US" smtClean="0"/>
+              <a:rPr lang="en-US"/>
               <a:t>Click to edit Master title style</a:t>
             </a:r>
-            <a:endParaRPr lang="en-US"/>
           </a:p>
         </p:txBody>
       </p:sp>
@@ -1739,7 +1722,7 @@
           <a:p>
             <a:fld id="{C518ABF7-4099-46EB-BEB9-ADE57982C939}" type="datetimeFigureOut">
               <a:rPr lang="en-US" smtClean="0"/>
-              <a:t>3/9/2020</a:t>
+              <a:t>10/2/2020</a:t>
             </a:fld>
             <a:endParaRPr lang="en-US"/>
           </a:p>
@@ -1834,7 +1817,7 @@
           <a:p>
             <a:fld id="{C518ABF7-4099-46EB-BEB9-ADE57982C939}" type="datetimeFigureOut">
               <a:rPr lang="en-US" smtClean="0"/>
-              <a:t>3/9/2020</a:t>
+              <a:t>10/2/2020</a:t>
             </a:fld>
             <a:endParaRPr lang="en-US"/>
           </a:p>
@@ -1937,10 +1920,9 @@
           </a:lstStyle>
           <a:p>
             <a:r>
-              <a:rPr lang="en-US" smtClean="0"/>
+              <a:rPr lang="en-US"/>
               <a:t>Click to edit Master title style</a:t>
             </a:r>
-            <a:endParaRPr lang="en-US"/>
           </a:p>
         </p:txBody>
       </p:sp>
@@ -1994,38 +1976,37 @@
           <a:p>
             <a:pPr lvl="0"/>
             <a:r>
-              <a:rPr lang="en-US" smtClean="0"/>
+              <a:rPr lang="en-US"/>
               <a:t>Edit Master text styles</a:t>
             </a:r>
           </a:p>
           <a:p>
             <a:pPr lvl="1"/>
             <a:r>
-              <a:rPr lang="en-US" smtClean="0"/>
+              <a:rPr lang="en-US"/>
               <a:t>Second level</a:t>
             </a:r>
           </a:p>
           <a:p>
             <a:pPr lvl="2"/>
             <a:r>
-              <a:rPr lang="en-US" smtClean="0"/>
+              <a:rPr lang="en-US"/>
               <a:t>Third level</a:t>
             </a:r>
           </a:p>
           <a:p>
             <a:pPr lvl="3"/>
             <a:r>
-              <a:rPr lang="en-US" smtClean="0"/>
+              <a:rPr lang="en-US"/>
               <a:t>Fourth level</a:t>
             </a:r>
           </a:p>
           <a:p>
             <a:pPr lvl="4"/>
             <a:r>
-              <a:rPr lang="en-US" smtClean="0"/>
+              <a:rPr lang="en-US"/>
               <a:t>Fifth level</a:t>
             </a:r>
-            <a:endParaRPr lang="en-US"/>
           </a:p>
         </p:txBody>
       </p:sp>
@@ -2088,7 +2069,7 @@
           <a:p>
             <a:pPr lvl="0"/>
             <a:r>
-              <a:rPr lang="en-US" smtClean="0"/>
+              <a:rPr lang="en-US"/>
               <a:t>Edit Master text styles</a:t>
             </a:r>
           </a:p>
@@ -2111,7 +2092,7 @@
           <a:p>
             <a:fld id="{C518ABF7-4099-46EB-BEB9-ADE57982C939}" type="datetimeFigureOut">
               <a:rPr lang="en-US" smtClean="0"/>
-              <a:t>3/9/2020</a:t>
+              <a:t>10/2/2020</a:t>
             </a:fld>
             <a:endParaRPr lang="en-US"/>
           </a:p>
@@ -2214,10 +2195,9 @@
           </a:lstStyle>
           <a:p>
             <a:r>
-              <a:rPr lang="en-US" smtClean="0"/>
+              <a:rPr lang="en-US"/>
               <a:t>Click to edit Master title style</a:t>
             </a:r>
-            <a:endParaRPr lang="en-US"/>
           </a:p>
         </p:txBody>
       </p:sp>
@@ -2341,7 +2321,7 @@
           <a:p>
             <a:pPr lvl="0"/>
             <a:r>
-              <a:rPr lang="en-US" smtClean="0"/>
+              <a:rPr lang="en-US"/>
               <a:t>Edit Master text styles</a:t>
             </a:r>
           </a:p>
@@ -2364,7 +2344,7 @@
           <a:p>
             <a:fld id="{C518ABF7-4099-46EB-BEB9-ADE57982C939}" type="datetimeFigureOut">
               <a:rPr lang="en-US" smtClean="0"/>
-              <a:t>3/9/2020</a:t>
+              <a:t>10/2/2020</a:t>
             </a:fld>
             <a:endParaRPr lang="en-US"/>
           </a:p>
@@ -2473,10 +2453,9 @@
           <a:lstStyle/>
           <a:p>
             <a:r>
-              <a:rPr lang="en-US" smtClean="0"/>
+              <a:rPr lang="en-US"/>
               <a:t>Click to edit Master title style</a:t>
             </a:r>
-            <a:endParaRPr lang="en-US"/>
           </a:p>
         </p:txBody>
       </p:sp>
@@ -2507,38 +2486,37 @@
           <a:p>
             <a:pPr lvl="0"/>
             <a:r>
-              <a:rPr lang="en-US" smtClean="0"/>
+              <a:rPr lang="en-US"/>
               <a:t>Edit Master text styles</a:t>
             </a:r>
           </a:p>
           <a:p>
             <a:pPr lvl="1"/>
             <a:r>
-              <a:rPr lang="en-US" smtClean="0"/>
+              <a:rPr lang="en-US"/>
               <a:t>Second level</a:t>
             </a:r>
           </a:p>
           <a:p>
             <a:pPr lvl="2"/>
             <a:r>
-              <a:rPr lang="en-US" smtClean="0"/>
+              <a:rPr lang="en-US"/>
               <a:t>Third level</a:t>
             </a:r>
           </a:p>
           <a:p>
             <a:pPr lvl="3"/>
             <a:r>
-              <a:rPr lang="en-US" smtClean="0"/>
+              <a:rPr lang="en-US"/>
               <a:t>Fourth level</a:t>
             </a:r>
           </a:p>
           <a:p>
             <a:pPr lvl="4"/>
             <a:r>
-              <a:rPr lang="en-US" smtClean="0"/>
+              <a:rPr lang="en-US"/>
               <a:t>Fifth level</a:t>
             </a:r>
-            <a:endParaRPr lang="en-US"/>
           </a:p>
         </p:txBody>
       </p:sp>
@@ -2577,7 +2555,7 @@
           <a:p>
             <a:fld id="{C518ABF7-4099-46EB-BEB9-ADE57982C939}" type="datetimeFigureOut">
               <a:rPr lang="en-US" smtClean="0"/>
-              <a:t>3/9/2020</a:t>
+              <a:t>10/2/2020</a:t>
             </a:fld>
             <a:endParaRPr lang="en-US"/>
           </a:p>
@@ -2998,10 +2976,9 @@
           <a:lstStyle/>
           <a:p>
             <a:r>
-              <a:rPr lang="en-US" dirty="0" smtClean="0"/>
+              <a:rPr lang="en-US" dirty="0"/>
               <a:t>Data Visualization Menu </a:t>
             </a:r>
-            <a:endParaRPr lang="en-US" dirty="0"/>
           </a:p>
         </p:txBody>
       </p:sp>
@@ -3021,10 +2998,9 @@
           <a:lstStyle/>
           <a:p>
             <a:r>
-              <a:rPr lang="en-US" dirty="0" smtClean="0"/>
-              <a:t>EICC Spring 2020</a:t>
-            </a:r>
-            <a:endParaRPr lang="en-US" dirty="0"/>
+              <a:rPr lang="en-US" dirty="0"/>
+              <a:t>EICC Fall 2020</a:t>
+            </a:r>
           </a:p>
         </p:txBody>
       </p:sp>
@@ -3074,18 +3050,9 @@
           <a:lstStyle/>
           <a:p>
             <a:r>
-              <a:rPr lang="en-US" dirty="0" smtClean="0"/>
-              <a:t>Alpha Diversity plot (</a:t>
-            </a:r>
-            <a:r>
-              <a:rPr lang="en-US" dirty="0" err="1" smtClean="0"/>
-              <a:t>phyloseq</a:t>
-            </a:r>
-            <a:r>
-              <a:rPr lang="en-US" dirty="0" smtClean="0"/>
-              <a:t>)</a:t>
-            </a:r>
-            <a:endParaRPr lang="en-US" dirty="0"/>
+              <a:rPr lang="en-US" dirty="0"/>
+              <a:t>Alpha Diversity plot (R-ggplot2)</a:t>
+            </a:r>
           </a:p>
         </p:txBody>
       </p:sp>
@@ -3380,10 +3347,9 @@
           <a:lstStyle/>
           <a:p>
             <a:r>
-              <a:rPr lang="en-US" sz="3200" dirty="0" smtClean="0"/>
-              <a:t>Beta Diversity Principal Coordinates Analysis plot (QIIME2) </a:t>
-            </a:r>
-            <a:endParaRPr lang="en-US" sz="3200" dirty="0"/>
+              <a:rPr lang="en-US" sz="2400" dirty="0"/>
+              <a:t>Beta Diversity Principal Coordinates Analysis plot (QIIME2 and R- ggplot2) </a:t>
+            </a:r>
           </a:p>
         </p:txBody>
       </p:sp>
@@ -3424,7 +3390,7 @@
           </p:cNvPicPr>
           <p:nvPr/>
         </p:nvPicPr>
-        <p:blipFill>
+        <p:blipFill rotWithShape="1">
           <a:blip r:embed="rId3" cstate="print">
             <a:extLst>
               <a:ext uri="{28A0092B-C50C-407E-A947-70E740481C1C}">
@@ -3432,14 +3398,13 @@
               </a:ext>
             </a:extLst>
           </a:blip>
-          <a:stretch>
-            <a:fillRect/>
-          </a:stretch>
+          <a:srcRect t="5312" r="14058"/>
+          <a:stretch/>
         </p:blipFill>
         <p:spPr>
           <a:xfrm>
-            <a:off x="7126216" y="1778924"/>
-            <a:ext cx="4104280" cy="4576646"/>
+            <a:off x="7208988" y="1739214"/>
+            <a:ext cx="4308916" cy="3512303"/>
           </a:xfrm>
           <a:prstGeom prst="rect">
             <a:avLst/>
@@ -3538,18 +3503,9 @@
           <a:lstStyle/>
           <a:p>
             <a:r>
-              <a:rPr lang="en-US" dirty="0" smtClean="0"/>
-              <a:t>Taxa level-specific bar plot (</a:t>
-            </a:r>
-            <a:r>
-              <a:rPr lang="en-US" dirty="0" err="1" smtClean="0"/>
-              <a:t>phyloseq</a:t>
-            </a:r>
-            <a:r>
-              <a:rPr lang="en-US" dirty="0" smtClean="0"/>
-              <a:t>)</a:t>
-            </a:r>
-            <a:endParaRPr lang="en-US" dirty="0"/>
+              <a:rPr lang="en-US" dirty="0"/>
+              <a:t>Taxa level-specific bar plot (R-ggplot2)</a:t>
+            </a:r>
           </a:p>
         </p:txBody>
       </p:sp>
@@ -3720,10 +3676,9 @@
           <a:lstStyle/>
           <a:p>
             <a:r>
-              <a:rPr lang="en-US" dirty="0" smtClean="0"/>
-              <a:t>ASV-specific box plot</a:t>
-            </a:r>
-            <a:endParaRPr lang="en-US" dirty="0"/>
+              <a:rPr lang="en-US" dirty="0"/>
+              <a:t>ASV-specific box plot(R-ggplot2)</a:t>
+            </a:r>
           </a:p>
         </p:txBody>
       </p:sp>
@@ -3855,183 +3810,6 @@
     <p:extLst>
       <p:ext uri="{BB962C8B-B14F-4D97-AF65-F5344CB8AC3E}">
         <p14:creationId xmlns:p14="http://schemas.microsoft.com/office/powerpoint/2010/main" val="100657840"/>
-      </p:ext>
-    </p:extLst>
-  </p:cSld>
-  <p:clrMapOvr>
-    <a:masterClrMapping/>
-  </p:clrMapOvr>
-</p:sld>
-</file>
-
-<file path=ppt/slides/slide14.xml><?xml version="1.0" encoding="utf-8"?>
-<p:sld xmlns:a="http://schemas.openxmlformats.org/drawingml/2006/main" xmlns:r="http://schemas.openxmlformats.org/officeDocument/2006/relationships" xmlns:p="http://schemas.openxmlformats.org/presentationml/2006/main">
-  <p:cSld>
-    <p:spTree>
-      <p:nvGrpSpPr>
-        <p:cNvPr id="1" name=""/>
-        <p:cNvGrpSpPr/>
-        <p:nvPr/>
-      </p:nvGrpSpPr>
-      <p:grpSpPr>
-        <a:xfrm>
-          <a:off x="0" y="0"/>
-          <a:ext cx="0" cy="0"/>
-          <a:chOff x="0" y="0"/>
-          <a:chExt cx="0" cy="0"/>
-        </a:xfrm>
-      </p:grpSpPr>
-      <p:sp>
-        <p:nvSpPr>
-          <p:cNvPr id="2" name="Title 1"/>
-          <p:cNvSpPr>
-            <a:spLocks noGrp="1"/>
-          </p:cNvSpPr>
-          <p:nvPr>
-            <p:ph type="title"/>
-          </p:nvPr>
-        </p:nvSpPr>
-        <p:spPr/>
-        <p:txBody>
-          <a:bodyPr/>
-          <a:lstStyle/>
-          <a:p>
-            <a:r>
-              <a:rPr lang="en-US" dirty="0" smtClean="0"/>
-              <a:t>Principal Components Analysis plot (LDM)</a:t>
-            </a:r>
-            <a:br>
-              <a:rPr lang="en-US" dirty="0" smtClean="0"/>
-            </a:br>
-            <a:endParaRPr lang="en-US" dirty="0"/>
-          </a:p>
-        </p:txBody>
-      </p:sp>
-      <p:pic>
-        <p:nvPicPr>
-          <p:cNvPr id="4" name="Content Placeholder 3"/>
-          <p:cNvPicPr>
-            <a:picLocks noGrp="1" noChangeAspect="1"/>
-          </p:cNvPicPr>
-          <p:nvPr>
-            <p:ph idx="1"/>
-          </p:nvPr>
-        </p:nvPicPr>
-        <p:blipFill>
-          <a:blip r:embed="rId2">
-            <a:extLst>
-              <a:ext uri="{28A0092B-C50C-407E-A947-70E740481C1C}">
-                <a14:useLocalDpi xmlns:a14="http://schemas.microsoft.com/office/drawing/2010/main" val="0"/>
-              </a:ext>
-            </a:extLst>
-          </a:blip>
-          <a:stretch>
-            <a:fillRect/>
-          </a:stretch>
-        </p:blipFill>
-        <p:spPr>
-          <a:xfrm>
-            <a:off x="3129915" y="1175299"/>
-            <a:ext cx="5548572" cy="5548572"/>
-          </a:xfrm>
-        </p:spPr>
-      </p:pic>
-      <p:sp>
-        <p:nvSpPr>
-          <p:cNvPr id="5" name="Rectangle 4"/>
-          <p:cNvSpPr/>
-          <p:nvPr/>
-        </p:nvSpPr>
-        <p:spPr>
-          <a:xfrm>
-            <a:off x="3749040" y="1371600"/>
-            <a:ext cx="4929447" cy="448887"/>
-          </a:xfrm>
-          <a:prstGeom prst="rect">
-            <a:avLst/>
-          </a:prstGeom>
-          <a:solidFill>
-            <a:schemeClr val="bg1"/>
-          </a:solidFill>
-          <a:ln>
-            <a:noFill/>
-          </a:ln>
-        </p:spPr>
-        <p:style>
-          <a:lnRef idx="2">
-            <a:schemeClr val="accent1">
-              <a:shade val="50000"/>
-            </a:schemeClr>
-          </a:lnRef>
-          <a:fillRef idx="1">
-            <a:schemeClr val="accent1"/>
-          </a:fillRef>
-          <a:effectRef idx="0">
-            <a:schemeClr val="accent1"/>
-          </a:effectRef>
-          <a:fontRef idx="minor">
-            <a:schemeClr val="lt1"/>
-          </a:fontRef>
-        </p:style>
-        <p:txBody>
-          <a:bodyPr rtlCol="0" anchor="ctr"/>
-          <a:lstStyle/>
-          <a:p>
-            <a:pPr algn="ctr"/>
-            <a:endParaRPr lang="en-US"/>
-          </a:p>
-        </p:txBody>
-      </p:sp>
-      <p:sp>
-        <p:nvSpPr>
-          <p:cNvPr id="6" name="Rectangle 5"/>
-          <p:cNvSpPr/>
-          <p:nvPr/>
-        </p:nvSpPr>
-        <p:spPr>
-          <a:xfrm>
-            <a:off x="4073236" y="1978429"/>
-            <a:ext cx="847899" cy="748146"/>
-          </a:xfrm>
-          <a:prstGeom prst="rect">
-            <a:avLst/>
-          </a:prstGeom>
-          <a:solidFill>
-            <a:schemeClr val="bg1"/>
-          </a:solidFill>
-          <a:ln>
-            <a:noFill/>
-          </a:ln>
-        </p:spPr>
-        <p:style>
-          <a:lnRef idx="2">
-            <a:schemeClr val="accent1">
-              <a:shade val="50000"/>
-            </a:schemeClr>
-          </a:lnRef>
-          <a:fillRef idx="1">
-            <a:schemeClr val="accent1"/>
-          </a:fillRef>
-          <a:effectRef idx="0">
-            <a:schemeClr val="accent1"/>
-          </a:effectRef>
-          <a:fontRef idx="minor">
-            <a:schemeClr val="lt1"/>
-          </a:fontRef>
-        </p:style>
-        <p:txBody>
-          <a:bodyPr rtlCol="0" anchor="ctr"/>
-          <a:lstStyle/>
-          <a:p>
-            <a:pPr algn="ctr"/>
-            <a:endParaRPr lang="en-US"/>
-          </a:p>
-        </p:txBody>
-      </p:sp>
-    </p:spTree>
-    <p:extLst>
-      <p:ext uri="{BB962C8B-B14F-4D97-AF65-F5344CB8AC3E}">
-        <p14:creationId xmlns:p14="http://schemas.microsoft.com/office/powerpoint/2010/main" val="3114983461"/>
       </p:ext>
     </p:extLst>
   </p:cSld>
@@ -4074,59 +3852,58 @@
           <a:lstStyle/>
           <a:p>
             <a:r>
-              <a:rPr lang="en-US" dirty="0" smtClean="0"/>
+              <a:rPr lang="en-US" dirty="0"/>
               <a:t>RNA Seq (bulk) analysis</a:t>
             </a:r>
+          </a:p>
+        </p:txBody>
+      </p:sp>
+      <p:sp>
+        <p:nvSpPr>
+          <p:cNvPr id="3" name="Content Placeholder 2"/>
+          <p:cNvSpPr>
+            <a:spLocks noGrp="1"/>
+          </p:cNvSpPr>
+          <p:nvPr>
+            <p:ph idx="1"/>
+          </p:nvPr>
+        </p:nvSpPr>
+        <p:spPr/>
+        <p:txBody>
+          <a:bodyPr/>
+          <a:lstStyle/>
+          <a:p>
+            <a:r>
+              <a:rPr lang="en-US" dirty="0"/>
+              <a:t>Principal Components Analysis plot</a:t>
+            </a:r>
+          </a:p>
+          <a:p>
+            <a:r>
+              <a:rPr lang="en-US" dirty="0"/>
+              <a:t>Heat map</a:t>
+            </a:r>
+          </a:p>
+          <a:p>
+            <a:r>
+              <a:rPr lang="en-US" dirty="0"/>
+              <a:t>Volcano plot</a:t>
+            </a:r>
+          </a:p>
+          <a:p>
+            <a:r>
+              <a:rPr lang="en-US" dirty="0"/>
+              <a:t>Gene-specific dot plot</a:t>
+            </a:r>
+          </a:p>
+          <a:p>
+            <a:r>
+              <a:rPr lang="en-US" dirty="0"/>
+              <a:t>Venn Diagram</a:t>
+            </a:r>
+          </a:p>
+          <a:p>
             <a:endParaRPr lang="en-US" dirty="0"/>
-          </a:p>
-        </p:txBody>
-      </p:sp>
-      <p:sp>
-        <p:nvSpPr>
-          <p:cNvPr id="3" name="Content Placeholder 2"/>
-          <p:cNvSpPr>
-            <a:spLocks noGrp="1"/>
-          </p:cNvSpPr>
-          <p:nvPr>
-            <p:ph idx="1"/>
-          </p:nvPr>
-        </p:nvSpPr>
-        <p:spPr/>
-        <p:txBody>
-          <a:bodyPr/>
-          <a:lstStyle/>
-          <a:p>
-            <a:r>
-              <a:rPr lang="en-US" dirty="0" smtClean="0"/>
-              <a:t>Principal Components Analysis plot</a:t>
-            </a:r>
-          </a:p>
-          <a:p>
-            <a:r>
-              <a:rPr lang="en-US" dirty="0" smtClean="0"/>
-              <a:t>Heat map</a:t>
-            </a:r>
-          </a:p>
-          <a:p>
-            <a:r>
-              <a:rPr lang="en-US" dirty="0" smtClean="0"/>
-              <a:t>Volcano plot</a:t>
-            </a:r>
-          </a:p>
-          <a:p>
-            <a:r>
-              <a:rPr lang="en-US" dirty="0" smtClean="0"/>
-              <a:t>Gene-specific dot plot</a:t>
-            </a:r>
-          </a:p>
-          <a:p>
-            <a:r>
-              <a:rPr lang="en-US" dirty="0" smtClean="0"/>
-              <a:t>Venn Diagram</a:t>
-            </a:r>
-          </a:p>
-          <a:p>
-            <a:endParaRPr lang="en-US" dirty="0" smtClean="0"/>
           </a:p>
         </p:txBody>
       </p:sp>
@@ -4172,14 +3949,15 @@
         </p:nvSpPr>
         <p:spPr/>
         <p:txBody>
-          <a:bodyPr/>
-          <a:lstStyle/>
-          <a:p>
-            <a:r>
-              <a:rPr lang="en-US" dirty="0" smtClean="0"/>
-              <a:t>Principal Components Analysis plot</a:t>
-            </a:r>
-            <a:endParaRPr lang="en-US" dirty="0"/>
+          <a:bodyPr>
+            <a:normAutofit/>
+          </a:bodyPr>
+          <a:lstStyle/>
+          <a:p>
+            <a:r>
+              <a:rPr lang="en-US" sz="4000" dirty="0"/>
+              <a:t>Principal Components Analysis plot (R- ggplot2)</a:t>
+            </a:r>
           </a:p>
         </p:txBody>
       </p:sp>
@@ -4206,8 +3984,8 @@
         </p:blipFill>
         <p:spPr>
           <a:xfrm>
-            <a:off x="1449266" y="1832005"/>
-            <a:ext cx="9293467" cy="4360979"/>
+            <a:off x="2114409" y="1882338"/>
+            <a:ext cx="7963182" cy="4360979"/>
           </a:xfrm>
         </p:spPr>
       </p:pic>
@@ -4257,10 +4035,17 @@
           <a:lstStyle/>
           <a:p>
             <a:r>
-              <a:rPr lang="en-US" dirty="0" smtClean="0"/>
-              <a:t>Heat map</a:t>
-            </a:r>
-            <a:endParaRPr lang="en-US" dirty="0"/>
+              <a:rPr lang="en-US" dirty="0"/>
+              <a:t>Heat map (R-</a:t>
+            </a:r>
+            <a:r>
+              <a:rPr lang="en-US" dirty="0" err="1"/>
+              <a:t>pheatmap</a:t>
+            </a:r>
+            <a:r>
+              <a:rPr lang="en-US" dirty="0"/>
+              <a:t>)</a:t>
+            </a:r>
           </a:p>
         </p:txBody>
       </p:sp>
@@ -4335,18 +4120,13 @@
           <a:lstStyle/>
           <a:p>
             <a:r>
-              <a:rPr lang="en-US" sz="1200" dirty="0" smtClean="0">
+              <a:rPr lang="en-US" sz="1200" dirty="0">
                 <a:solidFill>
                   <a:schemeClr val="tx1"/>
                 </a:solidFill>
               </a:rPr>
               <a:t>Genes sorted by smallest FDR</a:t>
             </a:r>
-            <a:endParaRPr lang="en-US" sz="1200" dirty="0">
-              <a:solidFill>
-                <a:schemeClr val="tx1"/>
-              </a:solidFill>
-            </a:endParaRPr>
           </a:p>
         </p:txBody>
       </p:sp>
@@ -4393,10 +4173,9 @@
           <a:p>
             <a:pPr algn="ctr"/>
             <a:r>
-              <a:rPr lang="en-US" dirty="0" smtClean="0"/>
+              <a:rPr lang="en-US" dirty="0"/>
               <a:t>sample</a:t>
             </a:r>
-            <a:endParaRPr lang="en-US" dirty="0"/>
           </a:p>
         </p:txBody>
       </p:sp>
@@ -4442,7 +4221,7 @@
           <a:lstStyle/>
           <a:p>
             <a:r>
-              <a:rPr lang="en-US" sz="1400" dirty="0" smtClean="0">
+              <a:rPr lang="en-US" sz="1400" dirty="0">
                 <a:solidFill>
                   <a:schemeClr val="tx1"/>
                 </a:solidFill>
@@ -4452,18 +4231,13 @@
           </a:p>
           <a:p>
             <a:r>
-              <a:rPr lang="en-US" sz="1400" dirty="0" smtClean="0">
+              <a:rPr lang="en-US" sz="1400" dirty="0">
                 <a:solidFill>
                   <a:schemeClr val="tx1"/>
                 </a:solidFill>
               </a:rPr>
               <a:t>Group 2</a:t>
             </a:r>
-            <a:endParaRPr lang="en-US" sz="1400" dirty="0">
-              <a:solidFill>
-                <a:schemeClr val="tx1"/>
-              </a:solidFill>
-            </a:endParaRPr>
           </a:p>
         </p:txBody>
       </p:sp>
@@ -4490,18 +4264,17 @@
           <a:lstStyle/>
           <a:p>
             <a:r>
-              <a:rPr lang="en-US" sz="800" dirty="0" smtClean="0"/>
+              <a:rPr lang="en-US" sz="800" dirty="0"/>
               <a:t>Gp2_SampleA</a:t>
             </a:r>
             <a:r>
-              <a:rPr lang="en-US" sz="1200" dirty="0" smtClean="0"/>
+              <a:rPr lang="en-US" sz="1200" dirty="0"/>
               <a:t>   </a:t>
             </a:r>
             <a:r>
-              <a:rPr lang="en-US" sz="800" dirty="0" smtClean="0"/>
+              <a:rPr lang="en-US" sz="800" dirty="0"/>
               <a:t>Gp2_SampleB         Gp2_Sample C     GP1_Sample D         GP1_Sample E      GP1_Sample F</a:t>
             </a:r>
-            <a:endParaRPr lang="en-US" sz="800" dirty="0"/>
           </a:p>
         </p:txBody>
       </p:sp>
@@ -4578,10 +4351,9 @@
           <a:p>
             <a:pPr algn="ctr"/>
             <a:r>
-              <a:rPr lang="en-US" dirty="0" smtClean="0"/>
+              <a:rPr lang="en-US" dirty="0"/>
               <a:t>sample</a:t>
             </a:r>
-            <a:endParaRPr lang="en-US" dirty="0"/>
           </a:p>
         </p:txBody>
       </p:sp>
@@ -4628,10 +4400,9 @@
           <a:p>
             <a:pPr algn="ctr"/>
             <a:r>
-              <a:rPr lang="en-US" dirty="0" smtClean="0"/>
+              <a:rPr lang="en-US" dirty="0"/>
               <a:t>sample</a:t>
             </a:r>
-            <a:endParaRPr lang="en-US" dirty="0"/>
           </a:p>
         </p:txBody>
       </p:sp>
@@ -4681,10 +4452,17 @@
           <a:lstStyle/>
           <a:p>
             <a:r>
-              <a:rPr lang="en-US" dirty="0" smtClean="0"/>
-              <a:t>Volcano plot</a:t>
-            </a:r>
-            <a:endParaRPr lang="en-US" dirty="0"/>
+              <a:rPr lang="en-US" dirty="0"/>
+              <a:t>Volcano plot (R-</a:t>
+            </a:r>
+            <a:r>
+              <a:rPr lang="en-US" dirty="0" err="1"/>
+              <a:t>EnhancedVolcano</a:t>
+            </a:r>
+            <a:r>
+              <a:rPr lang="en-US" dirty="0"/>
+              <a:t>)</a:t>
+            </a:r>
           </a:p>
         </p:txBody>
       </p:sp>
@@ -4698,23 +4476,57 @@
             <p:ph idx="1"/>
           </p:nvPr>
         </p:nvPicPr>
-        <p:blipFill>
-          <a:blip r:embed="rId2">
+        <p:blipFill rotWithShape="1">
+          <a:blip r:embed="rId2" cstate="print">
             <a:extLst>
               <a:ext uri="{28A0092B-C50C-407E-A947-70E740481C1C}">
                 <a14:useLocalDpi xmlns:a14="http://schemas.microsoft.com/office/drawing/2010/main" val="0"/>
               </a:ext>
             </a:extLst>
           </a:blip>
-          <a:stretch>
-            <a:fillRect/>
-          </a:stretch>
+          <a:srcRect t="5472" b="4652"/>
+          <a:stretch/>
         </p:blipFill>
         <p:spPr>
           <a:xfrm>
-            <a:off x="2883131" y="1496290"/>
-            <a:ext cx="6543502" cy="5297969"/>
-          </a:xfrm>
+            <a:off x="388677" y="1690689"/>
+            <a:ext cx="5707323" cy="4126452"/>
+          </a:xfrm>
+        </p:spPr>
+      </p:pic>
+      <p:pic>
+        <p:nvPicPr>
+          <p:cNvPr id="7" name="Picture 6" descr="Chart, scatter chart&#10;&#10;Description automatically generated">
+            <a:extLst>
+              <a:ext uri="{FF2B5EF4-FFF2-40B4-BE49-F238E27FC236}">
+                <a16:creationId xmlns:a16="http://schemas.microsoft.com/office/drawing/2014/main" id="{D464FE29-A683-4825-A8F2-132F2FDA4D84}"/>
+              </a:ext>
+            </a:extLst>
+          </p:cNvPr>
+          <p:cNvPicPr>
+            <a:picLocks noChangeAspect="1"/>
+          </p:cNvPicPr>
+          <p:nvPr/>
+        </p:nvPicPr>
+        <p:blipFill rotWithShape="1">
+          <a:blip r:embed="rId3">
+            <a:extLst>
+              <a:ext uri="{28A0092B-C50C-407E-A947-70E740481C1C}">
+                <a14:useLocalDpi xmlns:a14="http://schemas.microsoft.com/office/drawing/2010/main" val="0"/>
+              </a:ext>
+            </a:extLst>
+          </a:blip>
+          <a:srcRect b="7298"/>
+          <a:stretch/>
+        </p:blipFill>
+        <p:spPr>
+          <a:xfrm>
+            <a:off x="6096001" y="1575882"/>
+            <a:ext cx="5707323" cy="4241259"/>
+          </a:xfrm>
+          <a:prstGeom prst="rect">
+            <a:avLst/>
+          </a:prstGeom>
         </p:spPr>
       </p:pic>
     </p:spTree>
@@ -4763,10 +4575,9 @@
           <a:lstStyle/>
           <a:p>
             <a:r>
-              <a:rPr lang="en-US" dirty="0" smtClean="0"/>
-              <a:t>Gene-specific plots</a:t>
-            </a:r>
-            <a:endParaRPr lang="en-US" dirty="0"/>
+              <a:rPr lang="en-US" dirty="0"/>
+              <a:t>Gene-specific plots (R-ggplot2)</a:t>
+            </a:r>
           </a:p>
         </p:txBody>
       </p:sp>
@@ -5059,10 +4870,9 @@
           <a:lstStyle/>
           <a:p>
             <a:r>
-              <a:rPr lang="en-US" dirty="0" smtClean="0"/>
+              <a:rPr lang="en-US" dirty="0"/>
               <a:t>Venn Diagram</a:t>
             </a:r>
-            <a:endParaRPr lang="en-US" dirty="0"/>
           </a:p>
         </p:txBody>
       </p:sp>
@@ -5136,7 +4946,7 @@
           <a:bodyPr rtlCol="0" anchor="ctr"/>
           <a:lstStyle/>
           <a:p>
-            <a:endParaRPr lang="en-US" dirty="0" smtClean="0">
+            <a:endParaRPr lang="en-US" dirty="0">
               <a:solidFill>
                 <a:schemeClr val="tx1"/>
               </a:solidFill>
@@ -5144,7 +4954,7 @@
           </a:p>
           <a:p>
             <a:r>
-              <a:rPr lang="en-US" sz="1400" dirty="0" smtClean="0">
+              <a:rPr lang="en-US" sz="1400" dirty="0">
                 <a:solidFill>
                   <a:schemeClr val="tx1"/>
                 </a:solidFill>
@@ -5153,7 +4963,7 @@
             </a:r>
           </a:p>
           <a:p>
-            <a:endParaRPr lang="en-US" sz="1400" dirty="0" smtClean="0">
+            <a:endParaRPr lang="en-US" sz="1400" dirty="0">
               <a:solidFill>
                 <a:schemeClr val="tx1"/>
               </a:solidFill>
@@ -5161,7 +4971,7 @@
           </a:p>
           <a:p>
             <a:r>
-              <a:rPr lang="en-US" sz="1400" dirty="0" smtClean="0">
+              <a:rPr lang="en-US" sz="1400" dirty="0">
                 <a:solidFill>
                   <a:schemeClr val="tx1"/>
                 </a:solidFill>
@@ -5170,7 +4980,7 @@
             </a:r>
           </a:p>
           <a:p>
-            <a:endParaRPr lang="en-US" sz="1200" dirty="0" smtClean="0">
+            <a:endParaRPr lang="en-US" sz="1200" dirty="0">
               <a:solidFill>
                 <a:schemeClr val="tx1"/>
               </a:solidFill>
@@ -5178,18 +4988,13 @@
           </a:p>
           <a:p>
             <a:r>
-              <a:rPr lang="en-US" sz="1400" dirty="0" smtClean="0">
+              <a:rPr lang="en-US" sz="1400" dirty="0">
                 <a:solidFill>
                   <a:schemeClr val="tx1"/>
                 </a:solidFill>
               </a:rPr>
               <a:t>Group 3</a:t>
             </a:r>
-            <a:endParaRPr lang="en-US" sz="1400" dirty="0">
-              <a:solidFill>
-                <a:schemeClr val="tx1"/>
-              </a:solidFill>
-            </a:endParaRPr>
           </a:p>
         </p:txBody>
       </p:sp>
@@ -5239,87 +5044,86 @@
           <a:lstStyle/>
           <a:p>
             <a:r>
-              <a:rPr lang="en-US" dirty="0" smtClean="0"/>
+              <a:rPr lang="en-US" dirty="0"/>
               <a:t>16s Microbiome analysis</a:t>
             </a:r>
+          </a:p>
+        </p:txBody>
+      </p:sp>
+      <p:sp>
+        <p:nvSpPr>
+          <p:cNvPr id="3" name="Content Placeholder 2"/>
+          <p:cNvSpPr>
+            <a:spLocks noGrp="1"/>
+          </p:cNvSpPr>
+          <p:nvPr>
+            <p:ph idx="1"/>
+          </p:nvPr>
+        </p:nvSpPr>
+        <p:spPr/>
+        <p:txBody>
+          <a:bodyPr/>
+          <a:lstStyle/>
+          <a:p>
+            <a:r>
+              <a:rPr lang="en-US" dirty="0"/>
+              <a:t>Taxonomic bar plot (QIIME2)</a:t>
+            </a:r>
+          </a:p>
+          <a:p>
+            <a:r>
+              <a:rPr lang="en-US" dirty="0"/>
+              <a:t>Taxonomic bar plot (</a:t>
+            </a:r>
+            <a:r>
+              <a:rPr lang="en-US" dirty="0" err="1"/>
+              <a:t>phyloseq</a:t>
+            </a:r>
+            <a:r>
+              <a:rPr lang="en-US" dirty="0"/>
+              <a:t>)</a:t>
+            </a:r>
+          </a:p>
+          <a:p>
+            <a:r>
+              <a:rPr lang="en-US" dirty="0"/>
+              <a:t>Alpha Diversity plot</a:t>
+            </a:r>
+          </a:p>
+          <a:p>
+            <a:r>
+              <a:rPr lang="en-US" dirty="0"/>
+              <a:t>Beta Diversity Principal Coordinates Analysis plot </a:t>
+            </a:r>
+          </a:p>
+          <a:p>
+            <a:r>
+              <a:rPr lang="en-US" dirty="0"/>
+              <a:t>Taxa level-specific bar plot (</a:t>
+            </a:r>
+            <a:r>
+              <a:rPr lang="en-US" dirty="0" err="1"/>
+              <a:t>phyloseq</a:t>
+            </a:r>
+            <a:r>
+              <a:rPr lang="en-US" dirty="0"/>
+              <a:t>)</a:t>
+            </a:r>
+          </a:p>
+          <a:p>
+            <a:r>
+              <a:rPr lang="en-US" dirty="0"/>
+              <a:t>ASV-specific box plot</a:t>
+            </a:r>
+          </a:p>
+          <a:p>
+            <a:r>
+              <a:rPr lang="en-US" dirty="0"/>
+              <a:t>Principal Components Analysis plot (LDM)</a:t>
+            </a:r>
+          </a:p>
+          <a:p>
             <a:endParaRPr lang="en-US" dirty="0"/>
-          </a:p>
-        </p:txBody>
-      </p:sp>
-      <p:sp>
-        <p:nvSpPr>
-          <p:cNvPr id="3" name="Content Placeholder 2"/>
-          <p:cNvSpPr>
-            <a:spLocks noGrp="1"/>
-          </p:cNvSpPr>
-          <p:nvPr>
-            <p:ph idx="1"/>
-          </p:nvPr>
-        </p:nvSpPr>
-        <p:spPr/>
-        <p:txBody>
-          <a:bodyPr/>
-          <a:lstStyle/>
-          <a:p>
-            <a:r>
-              <a:rPr lang="en-US" dirty="0" smtClean="0"/>
-              <a:t>Taxonomic bar plot (QIIME2)</a:t>
-            </a:r>
-          </a:p>
-          <a:p>
-            <a:r>
-              <a:rPr lang="en-US" dirty="0" smtClean="0"/>
-              <a:t>Taxonomic bar plot (</a:t>
-            </a:r>
-            <a:r>
-              <a:rPr lang="en-US" dirty="0" err="1" smtClean="0"/>
-              <a:t>phyloseq</a:t>
-            </a:r>
-            <a:r>
-              <a:rPr lang="en-US" dirty="0" smtClean="0"/>
-              <a:t>)</a:t>
-            </a:r>
-          </a:p>
-          <a:p>
-            <a:r>
-              <a:rPr lang="en-US" dirty="0" smtClean="0"/>
-              <a:t>Alpha Diversity plot</a:t>
-            </a:r>
-          </a:p>
-          <a:p>
-            <a:r>
-              <a:rPr lang="en-US" dirty="0" smtClean="0"/>
-              <a:t>Beta Diversity Principal Coordinates Analysis plot </a:t>
-            </a:r>
-          </a:p>
-          <a:p>
-            <a:r>
-              <a:rPr lang="en-US" dirty="0" smtClean="0"/>
-              <a:t>Taxa level-specific bar plot (</a:t>
-            </a:r>
-            <a:r>
-              <a:rPr lang="en-US" dirty="0" err="1" smtClean="0"/>
-              <a:t>phyloseq</a:t>
-            </a:r>
-            <a:r>
-              <a:rPr lang="en-US" dirty="0" smtClean="0"/>
-              <a:t>)</a:t>
-            </a:r>
-          </a:p>
-          <a:p>
-            <a:r>
-              <a:rPr lang="en-US" dirty="0" smtClean="0"/>
-              <a:t>ASV-specific box plot</a:t>
-            </a:r>
-          </a:p>
-          <a:p>
-            <a:r>
-              <a:rPr lang="en-US" dirty="0" smtClean="0"/>
-              <a:t>Principal Components Analysis plot (LDM)</a:t>
-            </a:r>
-          </a:p>
-          <a:p>
-            <a:endParaRPr lang="en-US" dirty="0" smtClean="0"/>
           </a:p>
           <a:p>
             <a:endParaRPr lang="en-US" dirty="0"/>
@@ -5372,10 +5176,9 @@
           <a:lstStyle/>
           <a:p>
             <a:r>
-              <a:rPr lang="en-US" dirty="0" smtClean="0"/>
+              <a:rPr lang="en-US" dirty="0"/>
               <a:t>Taxonomic bar plot (QIIME2)</a:t>
             </a:r>
-            <a:endParaRPr lang="en-US" dirty="0"/>
           </a:p>
         </p:txBody>
       </p:sp>

</xml_diff>